<commit_message>
Update pap.sql, Pulseira Escolar.pptx, and ~$cardoTiago_RelatorioPAP12.docx
</commit_message>
<xml_diff>
--- a/PowerPoint/Pulseira Escolar.pptx
+++ b/PowerPoint/Pulseira Escolar.pptx
@@ -181,7 +181,7 @@
           <p:cNvPr id="2" name="Marcador de Posição do Cabeçalho 1">
             <a:extLst>
               <a:ext uri="{FF2B5EF4-FFF2-40B4-BE49-F238E27FC236}">
-                <a16:creationId xmlns="" xmlns:a16="http://schemas.microsoft.com/office/drawing/2014/main" id="{E400B95E-E471-4205-813C-3BF875FF53EB}"/>
+                <a16:creationId xmlns:a16="http://schemas.microsoft.com/office/drawing/2014/main" xmlns="" id="{E400B95E-E471-4205-813C-3BF875FF53EB}"/>
               </a:ext>
             </a:extLst>
           </p:cNvPr>
@@ -218,7 +218,7 @@
           <p:cNvPr id="3" name="Marcador de Posição da Data 2">
             <a:extLst>
               <a:ext uri="{FF2B5EF4-FFF2-40B4-BE49-F238E27FC236}">
-                <a16:creationId xmlns="" xmlns:a16="http://schemas.microsoft.com/office/drawing/2014/main" id="{DD1297C2-AB0E-4378-9B69-01C3462B88A8}"/>
+                <a16:creationId xmlns:a16="http://schemas.microsoft.com/office/drawing/2014/main" xmlns="" id="{DD1297C2-AB0E-4378-9B69-01C3462B88A8}"/>
               </a:ext>
             </a:extLst>
           </p:cNvPr>
@@ -248,7 +248,7 @@
           <a:p>
             <a:fld id="{FBA363AF-BAD4-4C3D-B96C-CC93693C27C7}" type="datetimeFigureOut">
               <a:rPr lang="pt-PT" smtClean="0"/>
-              <a:t>09/07/2021</a:t>
+              <a:t>14/07/2021</a:t>
             </a:fld>
             <a:endParaRPr lang="pt-PT"/>
           </a:p>
@@ -259,7 +259,7 @@
           <p:cNvPr id="4" name="Marcador de Posição do Rodapé 3">
             <a:extLst>
               <a:ext uri="{FF2B5EF4-FFF2-40B4-BE49-F238E27FC236}">
-                <a16:creationId xmlns="" xmlns:a16="http://schemas.microsoft.com/office/drawing/2014/main" id="{2D229431-5E36-4F49-8D91-BFDAA2D4C134}"/>
+                <a16:creationId xmlns:a16="http://schemas.microsoft.com/office/drawing/2014/main" xmlns="" id="{2D229431-5E36-4F49-8D91-BFDAA2D4C134}"/>
               </a:ext>
             </a:extLst>
           </p:cNvPr>
@@ -296,7 +296,7 @@
           <p:cNvPr id="5" name="Marcador de Posição do Número do Diapositivo 4">
             <a:extLst>
               <a:ext uri="{FF2B5EF4-FFF2-40B4-BE49-F238E27FC236}">
-                <a16:creationId xmlns="" xmlns:a16="http://schemas.microsoft.com/office/drawing/2014/main" id="{AE7E518D-363A-4ADA-8D0F-66B2D1ACEC70}"/>
+                <a16:creationId xmlns:a16="http://schemas.microsoft.com/office/drawing/2014/main" xmlns="" id="{AE7E518D-363A-4ADA-8D0F-66B2D1ACEC70}"/>
               </a:ext>
             </a:extLst>
           </p:cNvPr>
@@ -569,7 +569,7 @@
           <a:p>
             <a:fld id="{3BB57D88-2059-44C5-A173-93507E5D804C}" type="datetimeFigureOut">
               <a:rPr lang="pt-PT" smtClean="0"/>
-              <a:t>09/07/2021</a:t>
+              <a:t>14/07/2021</a:t>
             </a:fld>
             <a:endParaRPr lang="pt-PT"/>
           </a:p>
@@ -777,7 +777,7 @@
           <a:p>
             <a:fld id="{3BB57D88-2059-44C5-A173-93507E5D804C}" type="datetimeFigureOut">
               <a:rPr lang="pt-PT" smtClean="0"/>
-              <a:t>09/07/2021</a:t>
+              <a:t>14/07/2021</a:t>
             </a:fld>
             <a:endParaRPr lang="pt-PT"/>
           </a:p>
@@ -1033,7 +1033,7 @@
           <a:p>
             <a:fld id="{3BB57D88-2059-44C5-A173-93507E5D804C}" type="datetimeFigureOut">
               <a:rPr lang="pt-PT" smtClean="0"/>
-              <a:t>09/07/2021</a:t>
+              <a:t>14/07/2021</a:t>
             </a:fld>
             <a:endParaRPr lang="pt-PT"/>
           </a:p>
@@ -1203,7 +1203,7 @@
           <a:p>
             <a:fld id="{3BB57D88-2059-44C5-A173-93507E5D804C}" type="datetimeFigureOut">
               <a:rPr lang="pt-PT" smtClean="0"/>
-              <a:t>09/07/2021</a:t>
+              <a:t>14/07/2021</a:t>
             </a:fld>
             <a:endParaRPr lang="pt-PT"/>
           </a:p>
@@ -1546,7 +1546,7 @@
           <a:p>
             <a:fld id="{3BB57D88-2059-44C5-A173-93507E5D804C}" type="datetimeFigureOut">
               <a:rPr lang="pt-PT" smtClean="0"/>
-              <a:t>09/07/2021</a:t>
+              <a:t>14/07/2021</a:t>
             </a:fld>
             <a:endParaRPr lang="pt-PT"/>
           </a:p>
@@ -1821,7 +1821,7 @@
           <a:p>
             <a:fld id="{3BB57D88-2059-44C5-A173-93507E5D804C}" type="datetimeFigureOut">
               <a:rPr lang="pt-PT" smtClean="0"/>
-              <a:t>09/07/2021</a:t>
+              <a:t>14/07/2021</a:t>
             </a:fld>
             <a:endParaRPr lang="pt-PT"/>
           </a:p>
@@ -2200,7 +2200,7 @@
           <a:p>
             <a:fld id="{3BB57D88-2059-44C5-A173-93507E5D804C}" type="datetimeFigureOut">
               <a:rPr lang="pt-PT" smtClean="0"/>
-              <a:t>09/07/2021</a:t>
+              <a:t>14/07/2021</a:t>
             </a:fld>
             <a:endParaRPr lang="pt-PT"/>
           </a:p>
@@ -2318,7 +2318,7 @@
           <a:p>
             <a:fld id="{3BB57D88-2059-44C5-A173-93507E5D804C}" type="datetimeFigureOut">
               <a:rPr lang="pt-PT" smtClean="0"/>
-              <a:t>09/07/2021</a:t>
+              <a:t>14/07/2021</a:t>
             </a:fld>
             <a:endParaRPr lang="pt-PT"/>
           </a:p>
@@ -2489,7 +2489,7 @@
           <a:p>
             <a:fld id="{3BB57D88-2059-44C5-A173-93507E5D804C}" type="datetimeFigureOut">
               <a:rPr lang="pt-PT" smtClean="0"/>
-              <a:t>09/07/2021</a:t>
+              <a:t>14/07/2021</a:t>
             </a:fld>
             <a:endParaRPr lang="pt-PT"/>
           </a:p>
@@ -2843,7 +2843,7 @@
           <a:p>
             <a:fld id="{3BB57D88-2059-44C5-A173-93507E5D804C}" type="datetimeFigureOut">
               <a:rPr lang="pt-PT" smtClean="0"/>
-              <a:t>09/07/2021</a:t>
+              <a:t>14/07/2021</a:t>
             </a:fld>
             <a:endParaRPr lang="pt-PT"/>
           </a:p>
@@ -3225,7 +3225,7 @@
           <a:p>
             <a:fld id="{3BB57D88-2059-44C5-A173-93507E5D804C}" type="datetimeFigureOut">
               <a:rPr lang="pt-PT" smtClean="0"/>
-              <a:t>09/07/2021</a:t>
+              <a:t>14/07/2021</a:t>
             </a:fld>
             <a:endParaRPr lang="pt-PT"/>
           </a:p>
@@ -3512,7 +3512,7 @@
           <a:p>
             <a:fld id="{3BB57D88-2059-44C5-A173-93507E5D804C}" type="datetimeFigureOut">
               <a:rPr lang="pt-PT" smtClean="0"/>
-              <a:t>09/07/2021</a:t>
+              <a:t>14/07/2021</a:t>
             </a:fld>
             <a:endParaRPr lang="pt-PT"/>
           </a:p>
@@ -5274,11 +5274,11 @@
   <p:clrMapOvr>
     <a:masterClrMapping/>
   </p:clrMapOvr>
-  <mc:AlternateContent xmlns:mc="http://schemas.openxmlformats.org/markup-compatibility/2006">
-    <mc:Choice xmlns:p14="http://schemas.microsoft.com/office/powerpoint/2010/main" Requires="p14">
+  <mc:AlternateContent xmlns:mc="http://schemas.openxmlformats.org/markup-compatibility/2006" xmlns:p14="http://schemas.microsoft.com/office/powerpoint/2010/main">
+    <mc:Choice Requires="p14">
       <p:transition p14:dur="0"/>
     </mc:Choice>
-    <mc:Fallback>
+    <mc:Fallback xmlns="">
       <p:transition/>
     </mc:Fallback>
   </mc:AlternateContent>
@@ -6569,7 +6569,7 @@
           <p:cNvPr id="6" name="Retângulo: Cantos Arredondados 8">
             <a:extLst>
               <a:ext uri="{FF2B5EF4-FFF2-40B4-BE49-F238E27FC236}">
-                <a16:creationId xmlns="" xmlns:a16="http://schemas.microsoft.com/office/drawing/2014/main" id="{E61D4FB9-7672-4B20-A627-77CDD4F03F6C}"/>
+                <a16:creationId xmlns:a16="http://schemas.microsoft.com/office/drawing/2014/main" xmlns="" id="{E61D4FB9-7672-4B20-A627-77CDD4F03F6C}"/>
               </a:ext>
             </a:extLst>
           </p:cNvPr>
@@ -6875,7 +6875,7 @@
           </p:cNvPicPr>
           <p:nvPr/>
         </p:nvPicPr>
-        <p:blipFill>
+        <p:blipFill rotWithShape="1">
           <a:blip r:embed="rId3">
             <a:extLst>
               <a:ext uri="{28A0092B-C50C-407E-A947-70E740481C1C}">
@@ -6883,14 +6883,13 @@
               </a:ext>
             </a:extLst>
           </a:blip>
-          <a:stretch>
-            <a:fillRect/>
-          </a:stretch>
+          <a:srcRect l="39" t="1240"/>
+          <a:stretch/>
         </p:blipFill>
         <p:spPr>
           <a:xfrm>
-            <a:off x="144914" y="2451275"/>
-            <a:ext cx="8543121" cy="2945596"/>
+            <a:off x="148281" y="2487827"/>
+            <a:ext cx="8539754" cy="2909044"/>
           </a:xfrm>
           <a:prstGeom prst="rect">
             <a:avLst/>
@@ -6902,7 +6901,7 @@
           <p:cNvPr id="9" name="Retângulo: Cantos Arredondados 8">
             <a:extLst>
               <a:ext uri="{FF2B5EF4-FFF2-40B4-BE49-F238E27FC236}">
-                <a16:creationId xmlns="" xmlns:a16="http://schemas.microsoft.com/office/drawing/2014/main" id="{E61D4FB9-7672-4B20-A627-77CDD4F03F6C}"/>
+                <a16:creationId xmlns:a16="http://schemas.microsoft.com/office/drawing/2014/main" xmlns="" id="{E61D4FB9-7672-4B20-A627-77CDD4F03F6C}"/>
               </a:ext>
             </a:extLst>
           </p:cNvPr>
@@ -6954,7 +6953,7 @@
           <p:cNvPr id="7" name="Retângulo: Cantos Arredondados 8">
             <a:extLst>
               <a:ext uri="{FF2B5EF4-FFF2-40B4-BE49-F238E27FC236}">
-                <a16:creationId xmlns="" xmlns:a16="http://schemas.microsoft.com/office/drawing/2014/main" id="{E61D4FB9-7672-4B20-A627-77CDD4F03F6C}"/>
+                <a16:creationId xmlns:a16="http://schemas.microsoft.com/office/drawing/2014/main" xmlns="" id="{E61D4FB9-7672-4B20-A627-77CDD4F03F6C}"/>
               </a:ext>
             </a:extLst>
           </p:cNvPr>

</xml_diff>